<commit_message>
Instructions between conditions, Behavioural Loop Updates and Comments
</commit_message>
<xml_diff>
--- a/Instructions/instructions.pptx
+++ b/Instructions/instructions.pptx
@@ -5,7 +5,7 @@
     <p:sldMasterId id="2147483660" r:id="rId1"/>
   </p:sldMasterIdLst>
   <p:notesMasterIdLst>
-    <p:notesMasterId r:id="rId16"/>
+    <p:notesMasterId r:id="rId17"/>
   </p:notesMasterIdLst>
   <p:sldIdLst>
     <p:sldId id="286" r:id="rId2"/>
@@ -20,8 +20,9 @@
     <p:sldId id="296" r:id="rId11"/>
     <p:sldId id="293" r:id="rId12"/>
     <p:sldId id="294" r:id="rId13"/>
-    <p:sldId id="284" r:id="rId14"/>
-    <p:sldId id="261" r:id="rId15"/>
+    <p:sldId id="297" r:id="rId14"/>
+    <p:sldId id="284" r:id="rId15"/>
+    <p:sldId id="261" r:id="rId16"/>
   </p:sldIdLst>
   <p:sldSz cx="9144000" cy="6858000" type="screen4x3"/>
   <p:notesSz cx="6858000" cy="9144000"/>
@@ -221,7 +222,7 @@
           <a:p>
             <a:fld id="{2C27CEE3-7CDA-4780-9F85-765E50CB07F7}" type="datetimeFigureOut">
               <a:rPr lang="en-GB" smtClean="0"/>
-              <a:t>06/03/2020</a:t>
+              <a:t>09/03/2020</a:t>
             </a:fld>
             <a:endParaRPr lang="en-GB"/>
           </a:p>
@@ -670,7 +671,7 @@
           <a:p>
             <a:fld id="{0F3A0F3E-9580-46AF-A1DB-5E4659722DCF}" type="datetimeFigureOut">
               <a:rPr lang="en-GB" smtClean="0"/>
-              <a:t>06/03/2020</a:t>
+              <a:t>09/03/2020</a:t>
             </a:fld>
             <a:endParaRPr lang="en-GB"/>
           </a:p>
@@ -840,7 +841,7 @@
           <a:p>
             <a:fld id="{0F3A0F3E-9580-46AF-A1DB-5E4659722DCF}" type="datetimeFigureOut">
               <a:rPr lang="en-GB" smtClean="0"/>
-              <a:t>06/03/2020</a:t>
+              <a:t>09/03/2020</a:t>
             </a:fld>
             <a:endParaRPr lang="en-GB"/>
           </a:p>
@@ -1020,7 +1021,7 @@
           <a:p>
             <a:fld id="{0F3A0F3E-9580-46AF-A1DB-5E4659722DCF}" type="datetimeFigureOut">
               <a:rPr lang="en-GB" smtClean="0"/>
-              <a:t>06/03/2020</a:t>
+              <a:t>09/03/2020</a:t>
             </a:fld>
             <a:endParaRPr lang="en-GB"/>
           </a:p>
@@ -1190,7 +1191,7 @@
           <a:p>
             <a:fld id="{0F3A0F3E-9580-46AF-A1DB-5E4659722DCF}" type="datetimeFigureOut">
               <a:rPr lang="en-GB" smtClean="0"/>
-              <a:t>06/03/2020</a:t>
+              <a:t>09/03/2020</a:t>
             </a:fld>
             <a:endParaRPr lang="en-GB"/>
           </a:p>
@@ -1436,7 +1437,7 @@
           <a:p>
             <a:fld id="{0F3A0F3E-9580-46AF-A1DB-5E4659722DCF}" type="datetimeFigureOut">
               <a:rPr lang="en-GB" smtClean="0"/>
-              <a:t>06/03/2020</a:t>
+              <a:t>09/03/2020</a:t>
             </a:fld>
             <a:endParaRPr lang="en-GB"/>
           </a:p>
@@ -1724,7 +1725,7 @@
           <a:p>
             <a:fld id="{0F3A0F3E-9580-46AF-A1DB-5E4659722DCF}" type="datetimeFigureOut">
               <a:rPr lang="en-GB" smtClean="0"/>
-              <a:t>06/03/2020</a:t>
+              <a:t>09/03/2020</a:t>
             </a:fld>
             <a:endParaRPr lang="en-GB"/>
           </a:p>
@@ -2146,7 +2147,7 @@
           <a:p>
             <a:fld id="{0F3A0F3E-9580-46AF-A1DB-5E4659722DCF}" type="datetimeFigureOut">
               <a:rPr lang="en-GB" smtClean="0"/>
-              <a:t>06/03/2020</a:t>
+              <a:t>09/03/2020</a:t>
             </a:fld>
             <a:endParaRPr lang="en-GB"/>
           </a:p>
@@ -2264,7 +2265,7 @@
           <a:p>
             <a:fld id="{0F3A0F3E-9580-46AF-A1DB-5E4659722DCF}" type="datetimeFigureOut">
               <a:rPr lang="en-GB" smtClean="0"/>
-              <a:t>06/03/2020</a:t>
+              <a:t>09/03/2020</a:t>
             </a:fld>
             <a:endParaRPr lang="en-GB"/>
           </a:p>
@@ -2359,7 +2360,7 @@
           <a:p>
             <a:fld id="{0F3A0F3E-9580-46AF-A1DB-5E4659722DCF}" type="datetimeFigureOut">
               <a:rPr lang="en-GB" smtClean="0"/>
-              <a:t>06/03/2020</a:t>
+              <a:t>09/03/2020</a:t>
             </a:fld>
             <a:endParaRPr lang="en-GB"/>
           </a:p>
@@ -2636,7 +2637,7 @@
           <a:p>
             <a:fld id="{0F3A0F3E-9580-46AF-A1DB-5E4659722DCF}" type="datetimeFigureOut">
               <a:rPr lang="en-GB" smtClean="0"/>
-              <a:t>06/03/2020</a:t>
+              <a:t>09/03/2020</a:t>
             </a:fld>
             <a:endParaRPr lang="en-GB"/>
           </a:p>
@@ -2889,7 +2890,7 @@
           <a:p>
             <a:fld id="{0F3A0F3E-9580-46AF-A1DB-5E4659722DCF}" type="datetimeFigureOut">
               <a:rPr lang="en-GB" smtClean="0"/>
-              <a:t>06/03/2020</a:t>
+              <a:t>09/03/2020</a:t>
             </a:fld>
             <a:endParaRPr lang="en-GB"/>
           </a:p>
@@ -3108,7 +3109,7 @@
           <a:p>
             <a:fld id="{0F3A0F3E-9580-46AF-A1DB-5E4659722DCF}" type="datetimeFigureOut">
               <a:rPr lang="en-GB" smtClean="0"/>
-              <a:t>06/03/2020</a:t>
+              <a:t>09/03/2020</a:t>
             </a:fld>
             <a:endParaRPr lang="en-GB"/>
           </a:p>
@@ -5779,6 +5780,171 @@
         </p:nvSpPr>
         <p:spPr>
           <a:xfrm>
+            <a:off x="476838" y="332656"/>
+            <a:ext cx="8190305" cy="3970318"/>
+          </a:xfrm>
+          <a:prstGeom prst="rect">
+            <a:avLst/>
+          </a:prstGeom>
+          <a:noFill/>
+        </p:spPr>
+        <p:txBody>
+          <a:bodyPr wrap="square" rtlCol="0">
+            <a:spAutoFit/>
+          </a:bodyPr>
+          <a:lstStyle/>
+          <a:p>
+            <a:pPr algn="ctr"/>
+            <a:r>
+              <a:rPr lang="en-GB" sz="2800" dirty="0">
+                <a:solidFill>
+                  <a:schemeClr val="bg1">
+                    <a:lumMod val="95000"/>
+                    <a:lumOff val="5000"/>
+                  </a:schemeClr>
+                </a:solidFill>
+                <a:latin typeface="Arial" panose="020B0604020202020204" pitchFamily="34" charset="0"/>
+                <a:cs typeface="Arial" panose="020B0604020202020204" pitchFamily="34" charset="0"/>
+              </a:rPr>
+              <a:t>The next series of blocks will be in the ”Forced" mode. In this game mode, if you correctly choose the majority colour, you will win 100 points. If your choice is incorrect, you will lose 100 points. However, you will not get to choose how many tiles you flip before answering. Instead, you will flip tiles until you will be forced to give </a:t>
+            </a:r>
+            <a:r>
+              <a:rPr lang="en-GB" sz="2800">
+                <a:solidFill>
+                  <a:schemeClr val="bg1">
+                    <a:lumMod val="95000"/>
+                    <a:lumOff val="5000"/>
+                  </a:schemeClr>
+                </a:solidFill>
+                <a:latin typeface="Arial" panose="020B0604020202020204" pitchFamily="34" charset="0"/>
+                <a:cs typeface="Arial" panose="020B0604020202020204" pitchFamily="34" charset="0"/>
+              </a:rPr>
+              <a:t>a response.</a:t>
+            </a:r>
+            <a:endParaRPr lang="en-GB" sz="2800" dirty="0">
+              <a:solidFill>
+                <a:schemeClr val="bg1">
+                  <a:lumMod val="95000"/>
+                  <a:lumOff val="5000"/>
+                </a:schemeClr>
+              </a:solidFill>
+              <a:latin typeface="Arial" panose="020B0604020202020204" pitchFamily="34" charset="0"/>
+              <a:cs typeface="Arial" panose="020B0604020202020204" pitchFamily="34" charset="0"/>
+            </a:endParaRPr>
+          </a:p>
+          <a:p>
+            <a:pPr algn="ctr"/>
+            <a:endParaRPr lang="en-GB" sz="2800" dirty="0">
+              <a:solidFill>
+                <a:schemeClr val="bg1">
+                  <a:lumMod val="95000"/>
+                  <a:lumOff val="5000"/>
+                </a:schemeClr>
+              </a:solidFill>
+              <a:latin typeface="Arial" panose="020B0604020202020204" pitchFamily="34" charset="0"/>
+              <a:cs typeface="Arial" panose="020B0604020202020204" pitchFamily="34" charset="0"/>
+            </a:endParaRPr>
+          </a:p>
+          <a:p>
+            <a:pPr algn="ctr"/>
+            <a:r>
+              <a:rPr lang="en-GB" sz="2800" dirty="0">
+                <a:solidFill>
+                  <a:schemeClr val="bg1">
+                    <a:lumMod val="95000"/>
+                    <a:lumOff val="5000"/>
+                  </a:schemeClr>
+                </a:solidFill>
+                <a:latin typeface="Arial" panose="020B0604020202020204" pitchFamily="34" charset="0"/>
+                <a:cs typeface="Arial" panose="020B0604020202020204" pitchFamily="34" charset="0"/>
+              </a:rPr>
+              <a:t>You will now practice the task for a few trials.</a:t>
+            </a:r>
+          </a:p>
+        </p:txBody>
+      </p:sp>
+      <p:sp>
+        <p:nvSpPr>
+          <p:cNvPr id="3" name="TextBox 2">
+            <a:extLst>
+              <a:ext uri="{FF2B5EF4-FFF2-40B4-BE49-F238E27FC236}">
+                <a16:creationId xmlns:a16="http://schemas.microsoft.com/office/drawing/2014/main" id="{5DAB1131-D22D-A542-9DF5-46BAE980392A}"/>
+              </a:ext>
+            </a:extLst>
+          </p:cNvPr>
+          <p:cNvSpPr txBox="1"/>
+          <p:nvPr/>
+        </p:nvSpPr>
+        <p:spPr>
+          <a:xfrm>
+            <a:off x="1833902" y="5877272"/>
+            <a:ext cx="5476179" cy="523220"/>
+          </a:xfrm>
+          <a:prstGeom prst="rect">
+            <a:avLst/>
+          </a:prstGeom>
+          <a:noFill/>
+        </p:spPr>
+        <p:txBody>
+          <a:bodyPr wrap="none" rtlCol="0">
+            <a:spAutoFit/>
+          </a:bodyPr>
+          <a:lstStyle/>
+          <a:p>
+            <a:r>
+              <a:rPr lang="en-GB" sz="2800" dirty="0">
+                <a:solidFill>
+                  <a:schemeClr val="bg1">
+                    <a:lumMod val="95000"/>
+                    <a:lumOff val="5000"/>
+                  </a:schemeClr>
+                </a:solidFill>
+                <a:latin typeface="Arial" panose="020B0604020202020204" pitchFamily="34" charset="0"/>
+                <a:cs typeface="Arial" panose="020B0604020202020204" pitchFamily="34" charset="0"/>
+              </a:rPr>
+              <a:t>[Click to start the Practice Phase]</a:t>
+            </a:r>
+          </a:p>
+        </p:txBody>
+      </p:sp>
+    </p:spTree>
+    <p:extLst>
+      <p:ext uri="{BB962C8B-B14F-4D97-AF65-F5344CB8AC3E}">
+        <p14:creationId xmlns:p14="http://schemas.microsoft.com/office/powerpoint/2010/main" val="1502943416"/>
+      </p:ext>
+    </p:extLst>
+  </p:cSld>
+  <p:clrMapOvr>
+    <a:masterClrMapping/>
+  </p:clrMapOvr>
+</p:sld>
+</file>
+
+<file path=ppt/slides/slide14.xml><?xml version="1.0" encoding="utf-8"?>
+<p:sld xmlns:a="http://schemas.openxmlformats.org/drawingml/2006/main" xmlns:r="http://schemas.openxmlformats.org/officeDocument/2006/relationships" xmlns:p="http://schemas.openxmlformats.org/presentationml/2006/main">
+  <p:cSld>
+    <p:spTree>
+      <p:nvGrpSpPr>
+        <p:cNvPr id="1" name=""/>
+        <p:cNvGrpSpPr/>
+        <p:nvPr/>
+      </p:nvGrpSpPr>
+      <p:grpSpPr>
+        <a:xfrm>
+          <a:off x="0" y="0"/>
+          <a:ext cx="0" cy="0"/>
+          <a:chOff x="0" y="0"/>
+          <a:chExt cx="0" cy="0"/>
+        </a:xfrm>
+      </p:grpSpPr>
+      <p:sp>
+        <p:nvSpPr>
+          <p:cNvPr id="5" name="TextBox 4"/>
+          <p:cNvSpPr txBox="1"/>
+          <p:nvPr/>
+        </p:nvSpPr>
+        <p:spPr>
+          <a:xfrm>
             <a:off x="476847" y="3177262"/>
             <a:ext cx="8190305" cy="800219"/>
           </a:xfrm>
@@ -5926,7 +6092,7 @@
 </p:sld>
 </file>
 
-<file path=ppt/slides/slide14.xml><?xml version="1.0" encoding="utf-8"?>
+<file path=ppt/slides/slide15.xml><?xml version="1.0" encoding="utf-8"?>
 <p:sld xmlns:a="http://schemas.openxmlformats.org/drawingml/2006/main" xmlns:r="http://schemas.openxmlformats.org/officeDocument/2006/relationships" xmlns:p="http://schemas.openxmlformats.org/presentationml/2006/main">
   <p:cSld>
     <p:spTree>

</xml_diff>